<commit_message>
WIP on Exercices Python.pptx
</commit_message>
<xml_diff>
--- a/Exercices Python.pptx
+++ b/Exercices Python.pptx
@@ -12,8 +12,11 @@
     <p:sldId id="266" r:id="rId6"/>
     <p:sldId id="269" r:id="rId7"/>
     <p:sldId id="270" r:id="rId8"/>
-    <p:sldId id="271" r:id="rId9"/>
-    <p:sldId id="272" r:id="rId10"/>
+    <p:sldId id="274" r:id="rId9"/>
+    <p:sldId id="273" r:id="rId10"/>
+    <p:sldId id="271" r:id="rId11"/>
+    <p:sldId id="272" r:id="rId12"/>
+    <p:sldId id="275" r:id="rId13"/>
   </p:sldIdLst>
   <p:sldSz cx="12192000" cy="6858000"/>
   <p:notesSz cx="6858000" cy="9144000"/>
@@ -269,7 +272,7 @@
           <a:p>
             <a:fld id="{0CFD0564-1542-4FB2-AB8C-6ECDE0EDA3EE}" type="datetimeFigureOut">
               <a:rPr lang="fr-BE" smtClean="0"/>
-              <a:t>25-12-22</a:t>
+              <a:t>26-12-22</a:t>
             </a:fld>
             <a:endParaRPr lang="fr-BE"/>
           </a:p>
@@ -469,7 +472,7 @@
           <a:p>
             <a:fld id="{0CFD0564-1542-4FB2-AB8C-6ECDE0EDA3EE}" type="datetimeFigureOut">
               <a:rPr lang="fr-BE" smtClean="0"/>
-              <a:t>25-12-22</a:t>
+              <a:t>26-12-22</a:t>
             </a:fld>
             <a:endParaRPr lang="fr-BE"/>
           </a:p>
@@ -679,7 +682,7 @@
           <a:p>
             <a:fld id="{0CFD0564-1542-4FB2-AB8C-6ECDE0EDA3EE}" type="datetimeFigureOut">
               <a:rPr lang="fr-BE" smtClean="0"/>
-              <a:t>25-12-22</a:t>
+              <a:t>26-12-22</a:t>
             </a:fld>
             <a:endParaRPr lang="fr-BE"/>
           </a:p>
@@ -879,7 +882,7 @@
           <a:p>
             <a:fld id="{0CFD0564-1542-4FB2-AB8C-6ECDE0EDA3EE}" type="datetimeFigureOut">
               <a:rPr lang="fr-BE" smtClean="0"/>
-              <a:t>25-12-22</a:t>
+              <a:t>26-12-22</a:t>
             </a:fld>
             <a:endParaRPr lang="fr-BE"/>
           </a:p>
@@ -1155,7 +1158,7 @@
           <a:p>
             <a:fld id="{0CFD0564-1542-4FB2-AB8C-6ECDE0EDA3EE}" type="datetimeFigureOut">
               <a:rPr lang="fr-BE" smtClean="0"/>
-              <a:t>25-12-22</a:t>
+              <a:t>26-12-22</a:t>
             </a:fld>
             <a:endParaRPr lang="fr-BE"/>
           </a:p>
@@ -1423,7 +1426,7 @@
           <a:p>
             <a:fld id="{0CFD0564-1542-4FB2-AB8C-6ECDE0EDA3EE}" type="datetimeFigureOut">
               <a:rPr lang="fr-BE" smtClean="0"/>
-              <a:t>25-12-22</a:t>
+              <a:t>26-12-22</a:t>
             </a:fld>
             <a:endParaRPr lang="fr-BE"/>
           </a:p>
@@ -1838,7 +1841,7 @@
           <a:p>
             <a:fld id="{0CFD0564-1542-4FB2-AB8C-6ECDE0EDA3EE}" type="datetimeFigureOut">
               <a:rPr lang="fr-BE" smtClean="0"/>
-              <a:t>25-12-22</a:t>
+              <a:t>26-12-22</a:t>
             </a:fld>
             <a:endParaRPr lang="fr-BE"/>
           </a:p>
@@ -1980,7 +1983,7 @@
           <a:p>
             <a:fld id="{0CFD0564-1542-4FB2-AB8C-6ECDE0EDA3EE}" type="datetimeFigureOut">
               <a:rPr lang="fr-BE" smtClean="0"/>
-              <a:t>25-12-22</a:t>
+              <a:t>26-12-22</a:t>
             </a:fld>
             <a:endParaRPr lang="fr-BE"/>
           </a:p>
@@ -2093,7 +2096,7 @@
           <a:p>
             <a:fld id="{0CFD0564-1542-4FB2-AB8C-6ECDE0EDA3EE}" type="datetimeFigureOut">
               <a:rPr lang="fr-BE" smtClean="0"/>
-              <a:t>25-12-22</a:t>
+              <a:t>26-12-22</a:t>
             </a:fld>
             <a:endParaRPr lang="fr-BE"/>
           </a:p>
@@ -2406,7 +2409,7 @@
           <a:p>
             <a:fld id="{0CFD0564-1542-4FB2-AB8C-6ECDE0EDA3EE}" type="datetimeFigureOut">
               <a:rPr lang="fr-BE" smtClean="0"/>
-              <a:t>25-12-22</a:t>
+              <a:t>26-12-22</a:t>
             </a:fld>
             <a:endParaRPr lang="fr-BE"/>
           </a:p>
@@ -2695,7 +2698,7 @@
           <a:p>
             <a:fld id="{0CFD0564-1542-4FB2-AB8C-6ECDE0EDA3EE}" type="datetimeFigureOut">
               <a:rPr lang="fr-BE" smtClean="0"/>
-              <a:t>25-12-22</a:t>
+              <a:t>26-12-22</a:t>
             </a:fld>
             <a:endParaRPr lang="fr-BE"/>
           </a:p>
@@ -2938,7 +2941,7 @@
           <a:p>
             <a:fld id="{0CFD0564-1542-4FB2-AB8C-6ECDE0EDA3EE}" type="datetimeFigureOut">
               <a:rPr lang="fr-BE" smtClean="0"/>
-              <a:t>25-12-22</a:t>
+              <a:t>26-12-22</a:t>
             </a:fld>
             <a:endParaRPr lang="fr-BE"/>
           </a:p>
@@ -3438,6 +3441,715 @@
 </p:sld>
 </file>
 
+<file path=ppt/slides/slide10.xml><?xml version="1.0" encoding="utf-8"?>
+<p:sld xmlns:a="http://schemas.openxmlformats.org/drawingml/2006/main" xmlns:r="http://schemas.openxmlformats.org/officeDocument/2006/relationships" xmlns:p="http://schemas.openxmlformats.org/presentationml/2006/main">
+  <p:cSld>
+    <p:spTree>
+      <p:nvGrpSpPr>
+        <p:cNvPr id="1" name=""/>
+        <p:cNvGrpSpPr/>
+        <p:nvPr/>
+      </p:nvGrpSpPr>
+      <p:grpSpPr>
+        <a:xfrm>
+          <a:off x="0" y="0"/>
+          <a:ext cx="0" cy="0"/>
+          <a:chOff x="0" y="0"/>
+          <a:chExt cx="0" cy="0"/>
+        </a:xfrm>
+      </p:grpSpPr>
+      <p:sp>
+        <p:nvSpPr>
+          <p:cNvPr id="2" name="Titre 1">
+            <a:extLst>
+              <a:ext uri="{FF2B5EF4-FFF2-40B4-BE49-F238E27FC236}">
+                <a16:creationId xmlns:a16="http://schemas.microsoft.com/office/drawing/2014/main" id="{1A1863B0-1C29-5B27-50B6-664B87F82EF5}"/>
+              </a:ext>
+            </a:extLst>
+          </p:cNvPr>
+          <p:cNvSpPr>
+            <a:spLocks noGrp="1"/>
+          </p:cNvSpPr>
+          <p:nvPr>
+            <p:ph type="title"/>
+          </p:nvPr>
+        </p:nvSpPr>
+        <p:spPr/>
+        <p:txBody>
+          <a:bodyPr/>
+          <a:lstStyle/>
+          <a:p>
+            <a:r>
+              <a:rPr lang="fr-FR" dirty="0" err="1"/>
+              <a:t>AppSec</a:t>
+            </a:r>
+            <a:r>
+              <a:rPr lang="fr-FR" dirty="0"/>
+              <a:t> – Injection SQL</a:t>
+            </a:r>
+            <a:endParaRPr lang="fr-BE" dirty="0"/>
+          </a:p>
+        </p:txBody>
+      </p:sp>
+      <p:sp>
+        <p:nvSpPr>
+          <p:cNvPr id="3" name="Espace réservé du contenu 2">
+            <a:extLst>
+              <a:ext uri="{FF2B5EF4-FFF2-40B4-BE49-F238E27FC236}">
+                <a16:creationId xmlns:a16="http://schemas.microsoft.com/office/drawing/2014/main" id="{4B5DAC70-8C17-C178-9F6C-0C753B4B27CD}"/>
+              </a:ext>
+            </a:extLst>
+          </p:cNvPr>
+          <p:cNvSpPr>
+            <a:spLocks noGrp="1"/>
+          </p:cNvSpPr>
+          <p:nvPr>
+            <p:ph idx="1"/>
+          </p:nvPr>
+        </p:nvSpPr>
+        <p:spPr/>
+        <p:txBody>
+          <a:bodyPr/>
+          <a:lstStyle/>
+          <a:p>
+            <a:r>
+              <a:rPr lang="fr-FR" dirty="0"/>
+              <a:t>Toujours utiliser les </a:t>
+            </a:r>
+            <a:r>
+              <a:rPr lang="fr-FR" b="1" u="sng" dirty="0"/>
+              <a:t>requêtes préparées </a:t>
+            </a:r>
+            <a:r>
+              <a:rPr lang="fr-FR" dirty="0"/>
+              <a:t>(il y en a pour tous les langages)</a:t>
+            </a:r>
+          </a:p>
+          <a:p>
+            <a:r>
+              <a:rPr lang="fr-FR" dirty="0">
+                <a:hlinkClick r:id="rId2"/>
+              </a:rPr>
+              <a:t>https://fr.wikipedia.org/wiki/Injection_SQL</a:t>
+            </a:r>
+            <a:r>
+              <a:rPr lang="fr-FR" dirty="0"/>
+              <a:t> </a:t>
+            </a:r>
+          </a:p>
+          <a:p>
+            <a:r>
+              <a:rPr lang="fr-FR" dirty="0"/>
+              <a:t>OWASP Top </a:t>
+            </a:r>
+            <a:r>
+              <a:rPr lang="fr-FR" dirty="0" err="1"/>
+              <a:t>ten</a:t>
+            </a:r>
+            <a:r>
+              <a:rPr lang="fr-FR" dirty="0"/>
+              <a:t>: </a:t>
+            </a:r>
+            <a:r>
+              <a:rPr lang="fr-FR" dirty="0">
+                <a:hlinkClick r:id="rId3"/>
+              </a:rPr>
+              <a:t>https://owasp.org/www-project-top-ten/</a:t>
+            </a:r>
+            <a:endParaRPr lang="fr-FR" dirty="0"/>
+          </a:p>
+          <a:p>
+            <a:r>
+              <a:rPr lang="fr-FR" dirty="0" err="1"/>
+              <a:t>Aituglo</a:t>
+            </a:r>
+            <a:r>
+              <a:rPr lang="fr-FR" dirty="0"/>
+              <a:t> Comment récupérer une base de donnée d'un site ?! - SQL injection </a:t>
+            </a:r>
+            <a:r>
+              <a:rPr lang="fr-FR" dirty="0">
+                <a:hlinkClick r:id="rId4"/>
+              </a:rPr>
+              <a:t>https://youtu.be/YhbggVKuxo4</a:t>
+            </a:r>
+            <a:r>
+              <a:rPr lang="fr-FR" dirty="0"/>
+              <a:t> </a:t>
+            </a:r>
+          </a:p>
+          <a:p>
+            <a:r>
+              <a:rPr lang="fr-FR" dirty="0"/>
+              <a:t>Pour ceux que la sécurité intéresse: </a:t>
+            </a:r>
+            <a:r>
+              <a:rPr lang="fr-FR" dirty="0">
+                <a:hlinkClick r:id="rId5"/>
+              </a:rPr>
+              <a:t>https://github.com/digininja/DVWA</a:t>
+            </a:r>
+            <a:r>
+              <a:rPr lang="fr-FR" dirty="0"/>
+              <a:t> </a:t>
+            </a:r>
+          </a:p>
+          <a:p>
+            <a:endParaRPr lang="fr-BE" dirty="0"/>
+          </a:p>
+        </p:txBody>
+      </p:sp>
+      <p:sp>
+        <p:nvSpPr>
+          <p:cNvPr id="4" name="Rectangle 1">
+            <a:hlinkClick r:id="rId6" tooltip="Accueil YouTube"/>
+            <a:extLst>
+              <a:ext uri="{FF2B5EF4-FFF2-40B4-BE49-F238E27FC236}">
+                <a16:creationId xmlns:a16="http://schemas.microsoft.com/office/drawing/2014/main" id="{234C80F2-3AEE-F1BA-E04E-A48FFE7663FD}"/>
+              </a:ext>
+            </a:extLst>
+          </p:cNvPr>
+          <p:cNvSpPr>
+            <a:spLocks noChangeArrowheads="1"/>
+          </p:cNvSpPr>
+          <p:nvPr/>
+        </p:nvSpPr>
+        <p:spPr bwMode="auto">
+          <a:xfrm>
+            <a:off x="0" y="0"/>
+            <a:ext cx="12192000" cy="0"/>
+          </a:xfrm>
+          <a:prstGeom prst="rect">
+            <a:avLst/>
+          </a:prstGeom>
+          <a:noFill/>
+          <a:ln>
+            <a:noFill/>
+          </a:ln>
+          <a:effectLst/>
+          <a:extLst>
+            <a:ext uri="{909E8E84-426E-40DD-AFC4-6F175D3DCCD1}">
+              <a14:hiddenFill xmlns:a14="http://schemas.microsoft.com/office/drawing/2010/main">
+                <a:solidFill>
+                  <a:schemeClr val="accent1"/>
+                </a:solidFill>
+              </a14:hiddenFill>
+            </a:ext>
+            <a:ext uri="{91240B29-F687-4F45-9708-019B960494DF}">
+              <a14:hiddenLine xmlns:a14="http://schemas.microsoft.com/office/drawing/2010/main" w="9525">
+                <a:solidFill>
+                  <a:schemeClr val="tx1"/>
+                </a:solidFill>
+                <a:miter lim="800000"/>
+                <a:headEnd/>
+                <a:tailEnd/>
+              </a14:hiddenLine>
+            </a:ext>
+            <a:ext uri="{AF507438-7753-43E0-B8FC-AC1667EBCBE1}">
+              <a14:hiddenEffects xmlns:a14="http://schemas.microsoft.com/office/drawing/2010/main">
+                <a:effectLst>
+                  <a:outerShdw dist="35921" dir="2700000" algn="ctr" rotWithShape="0">
+                    <a:schemeClr val="bg2"/>
+                  </a:outerShdw>
+                </a:effectLst>
+              </a14:hiddenEffects>
+            </a:ext>
+          </a:extLst>
+        </p:spPr>
+        <p:txBody>
+          <a:bodyPr vert="horz" wrap="square" lIns="91440" tIns="45720" rIns="91440" bIns="45720" numCol="1" anchor="ctr" anchorCtr="0" compatLnSpc="1">
+            <a:prstTxWarp prst="textNoShape">
+              <a:avLst/>
+            </a:prstTxWarp>
+            <a:spAutoFit/>
+          </a:bodyPr>
+          <a:lstStyle/>
+          <a:p>
+            <a:endParaRPr lang="fr-BE"/>
+          </a:p>
+        </p:txBody>
+      </p:sp>
+      <p:sp>
+        <p:nvSpPr>
+          <p:cNvPr id="6" name="Rectangle 3">
+            <a:hlinkClick r:id="rId7"/>
+            <a:extLst>
+              <a:ext uri="{FF2B5EF4-FFF2-40B4-BE49-F238E27FC236}">
+                <a16:creationId xmlns:a16="http://schemas.microsoft.com/office/drawing/2014/main" id="{D3D3CB18-C04B-9DF7-D4F2-ECA96FCCEC7E}"/>
+              </a:ext>
+            </a:extLst>
+          </p:cNvPr>
+          <p:cNvSpPr>
+            <a:spLocks noChangeArrowheads="1"/>
+          </p:cNvSpPr>
+          <p:nvPr/>
+        </p:nvSpPr>
+        <p:spPr bwMode="auto">
+          <a:xfrm>
+            <a:off x="0" y="0"/>
+            <a:ext cx="2057400" cy="0"/>
+          </a:xfrm>
+          <a:prstGeom prst="rect">
+            <a:avLst/>
+          </a:prstGeom>
+          <a:noFill/>
+          <a:ln>
+            <a:noFill/>
+          </a:ln>
+          <a:effectLst/>
+          <a:extLst>
+            <a:ext uri="{909E8E84-426E-40DD-AFC4-6F175D3DCCD1}">
+              <a14:hiddenFill xmlns:a14="http://schemas.microsoft.com/office/drawing/2010/main">
+                <a:solidFill>
+                  <a:schemeClr val="accent1"/>
+                </a:solidFill>
+              </a14:hiddenFill>
+            </a:ext>
+            <a:ext uri="{91240B29-F687-4F45-9708-019B960494DF}">
+              <a14:hiddenLine xmlns:a14="http://schemas.microsoft.com/office/drawing/2010/main" w="9525">
+                <a:solidFill>
+                  <a:schemeClr val="tx1"/>
+                </a:solidFill>
+                <a:miter lim="800000"/>
+                <a:headEnd/>
+                <a:tailEnd/>
+              </a14:hiddenLine>
+            </a:ext>
+            <a:ext uri="{AF507438-7753-43E0-B8FC-AC1667EBCBE1}">
+              <a14:hiddenEffects xmlns:a14="http://schemas.microsoft.com/office/drawing/2010/main">
+                <a:effectLst>
+                  <a:outerShdw dist="35921" dir="2700000" algn="ctr" rotWithShape="0">
+                    <a:schemeClr val="bg2"/>
+                  </a:outerShdw>
+                </a:effectLst>
+              </a14:hiddenEffects>
+            </a:ext>
+          </a:extLst>
+        </p:spPr>
+        <p:txBody>
+          <a:bodyPr vert="horz" wrap="square" lIns="91440" tIns="45720" rIns="91440" bIns="45720" numCol="1" anchor="ctr" anchorCtr="0" compatLnSpc="1">
+            <a:prstTxWarp prst="textNoShape">
+              <a:avLst/>
+            </a:prstTxWarp>
+            <a:spAutoFit/>
+          </a:bodyPr>
+          <a:lstStyle/>
+          <a:p>
+            <a:endParaRPr lang="fr-BE"/>
+          </a:p>
+        </p:txBody>
+      </p:sp>
+      <p:sp>
+        <p:nvSpPr>
+          <p:cNvPr id="7" name="Rectangle 4">
+            <a:hlinkClick r:id="rId8"/>
+            <a:extLst>
+              <a:ext uri="{FF2B5EF4-FFF2-40B4-BE49-F238E27FC236}">
+                <a16:creationId xmlns:a16="http://schemas.microsoft.com/office/drawing/2014/main" id="{65D55827-796E-5D27-9651-0615AD163155}"/>
+              </a:ext>
+            </a:extLst>
+          </p:cNvPr>
+          <p:cNvSpPr>
+            <a:spLocks noChangeArrowheads="1"/>
+          </p:cNvSpPr>
+          <p:nvPr/>
+        </p:nvSpPr>
+        <p:spPr bwMode="auto">
+          <a:xfrm>
+            <a:off x="0" y="0"/>
+            <a:ext cx="984250" cy="0"/>
+          </a:xfrm>
+          <a:prstGeom prst="rect">
+            <a:avLst/>
+          </a:prstGeom>
+          <a:noFill/>
+          <a:ln>
+            <a:noFill/>
+          </a:ln>
+          <a:effectLst/>
+          <a:extLst>
+            <a:ext uri="{909E8E84-426E-40DD-AFC4-6F175D3DCCD1}">
+              <a14:hiddenFill xmlns:a14="http://schemas.microsoft.com/office/drawing/2010/main">
+                <a:solidFill>
+                  <a:schemeClr val="accent1"/>
+                </a:solidFill>
+              </a14:hiddenFill>
+            </a:ext>
+            <a:ext uri="{91240B29-F687-4F45-9708-019B960494DF}">
+              <a14:hiddenLine xmlns:a14="http://schemas.microsoft.com/office/drawing/2010/main" w="9525">
+                <a:solidFill>
+                  <a:schemeClr val="tx1"/>
+                </a:solidFill>
+                <a:miter lim="800000"/>
+                <a:headEnd/>
+                <a:tailEnd/>
+              </a14:hiddenLine>
+            </a:ext>
+            <a:ext uri="{AF507438-7753-43E0-B8FC-AC1667EBCBE1}">
+              <a14:hiddenEffects xmlns:a14="http://schemas.microsoft.com/office/drawing/2010/main">
+                <a:effectLst>
+                  <a:outerShdw dist="35921" dir="2700000" algn="ctr" rotWithShape="0">
+                    <a:schemeClr val="bg2"/>
+                  </a:outerShdw>
+                </a:effectLst>
+              </a14:hiddenEffects>
+            </a:ext>
+          </a:extLst>
+        </p:spPr>
+        <p:txBody>
+          <a:bodyPr vert="horz" wrap="square" lIns="91440" tIns="45720" rIns="91440" bIns="45720" numCol="1" anchor="ctr" anchorCtr="0" compatLnSpc="1">
+            <a:prstTxWarp prst="textNoShape">
+              <a:avLst/>
+            </a:prstTxWarp>
+            <a:spAutoFit/>
+          </a:bodyPr>
+          <a:lstStyle/>
+          <a:p>
+            <a:endParaRPr lang="fr-BE"/>
+          </a:p>
+        </p:txBody>
+      </p:sp>
+      <p:sp>
+        <p:nvSpPr>
+          <p:cNvPr id="8" name="Rectangle 5">
+            <a:extLst>
+              <a:ext uri="{FF2B5EF4-FFF2-40B4-BE49-F238E27FC236}">
+                <a16:creationId xmlns:a16="http://schemas.microsoft.com/office/drawing/2014/main" id="{B0E307A5-5347-FE04-541C-F27C8E036A6B}"/>
+              </a:ext>
+            </a:extLst>
+          </p:cNvPr>
+          <p:cNvSpPr>
+            <a:spLocks noChangeArrowheads="1"/>
+          </p:cNvSpPr>
+          <p:nvPr/>
+        </p:nvSpPr>
+        <p:spPr bwMode="auto">
+          <a:xfrm>
+            <a:off x="0" y="0"/>
+            <a:ext cx="12192000" cy="0"/>
+          </a:xfrm>
+          <a:prstGeom prst="rect">
+            <a:avLst/>
+          </a:prstGeom>
+          <a:noFill/>
+          <a:ln>
+            <a:noFill/>
+          </a:ln>
+          <a:effectLst/>
+          <a:extLst>
+            <a:ext uri="{909E8E84-426E-40DD-AFC4-6F175D3DCCD1}">
+              <a14:hiddenFill xmlns:a14="http://schemas.microsoft.com/office/drawing/2010/main">
+                <a:solidFill>
+                  <a:schemeClr val="accent1"/>
+                </a:solidFill>
+              </a14:hiddenFill>
+            </a:ext>
+            <a:ext uri="{91240B29-F687-4F45-9708-019B960494DF}">
+              <a14:hiddenLine xmlns:a14="http://schemas.microsoft.com/office/drawing/2010/main" w="9525">
+                <a:solidFill>
+                  <a:schemeClr val="tx1"/>
+                </a:solidFill>
+                <a:miter lim="800000"/>
+                <a:headEnd/>
+                <a:tailEnd/>
+              </a14:hiddenLine>
+            </a:ext>
+            <a:ext uri="{AF507438-7753-43E0-B8FC-AC1667EBCBE1}">
+              <a14:hiddenEffects xmlns:a14="http://schemas.microsoft.com/office/drawing/2010/main">
+                <a:effectLst>
+                  <a:outerShdw dist="35921" dir="2700000" algn="ctr" rotWithShape="0">
+                    <a:schemeClr val="bg2"/>
+                  </a:outerShdw>
+                </a:effectLst>
+              </a14:hiddenEffects>
+            </a:ext>
+          </a:extLst>
+        </p:spPr>
+        <p:txBody>
+          <a:bodyPr vert="horz" wrap="none" lIns="91440" tIns="45720" rIns="91440" bIns="45720" numCol="1" anchor="ctr" anchorCtr="0" compatLnSpc="1">
+            <a:prstTxWarp prst="textNoShape">
+              <a:avLst/>
+            </a:prstTxWarp>
+            <a:spAutoFit/>
+          </a:bodyPr>
+          <a:lstStyle/>
+          <a:p>
+            <a:endParaRPr lang="fr-BE"/>
+          </a:p>
+        </p:txBody>
+      </p:sp>
+    </p:spTree>
+    <p:extLst>
+      <p:ext uri="{BB962C8B-B14F-4D97-AF65-F5344CB8AC3E}">
+        <p14:creationId xmlns:p14="http://schemas.microsoft.com/office/powerpoint/2010/main" val="2480734286"/>
+      </p:ext>
+    </p:extLst>
+  </p:cSld>
+  <p:clrMapOvr>
+    <a:masterClrMapping/>
+  </p:clrMapOvr>
+</p:sld>
+</file>
+
+<file path=ppt/slides/slide11.xml><?xml version="1.0" encoding="utf-8"?>
+<p:sld xmlns:a="http://schemas.openxmlformats.org/drawingml/2006/main" xmlns:r="http://schemas.openxmlformats.org/officeDocument/2006/relationships" xmlns:p="http://schemas.openxmlformats.org/presentationml/2006/main">
+  <p:cSld>
+    <p:spTree>
+      <p:nvGrpSpPr>
+        <p:cNvPr id="1" name=""/>
+        <p:cNvGrpSpPr/>
+        <p:nvPr/>
+      </p:nvGrpSpPr>
+      <p:grpSpPr>
+        <a:xfrm>
+          <a:off x="0" y="0"/>
+          <a:ext cx="0" cy="0"/>
+          <a:chOff x="0" y="0"/>
+          <a:chExt cx="0" cy="0"/>
+        </a:xfrm>
+      </p:grpSpPr>
+      <p:sp>
+        <p:nvSpPr>
+          <p:cNvPr id="2" name="Titre 1">
+            <a:extLst>
+              <a:ext uri="{FF2B5EF4-FFF2-40B4-BE49-F238E27FC236}">
+                <a16:creationId xmlns:a16="http://schemas.microsoft.com/office/drawing/2014/main" id="{C6C832A5-9A2B-E876-1325-DD9386E5996A}"/>
+              </a:ext>
+            </a:extLst>
+          </p:cNvPr>
+          <p:cNvSpPr>
+            <a:spLocks noGrp="1"/>
+          </p:cNvSpPr>
+          <p:nvPr>
+            <p:ph type="title"/>
+          </p:nvPr>
+        </p:nvSpPr>
+        <p:spPr/>
+        <p:txBody>
+          <a:bodyPr/>
+          <a:lstStyle/>
+          <a:p>
+            <a:r>
+              <a:rPr lang="fr-FR" dirty="0"/>
+              <a:t>Organisation des fichiers</a:t>
+            </a:r>
+            <a:endParaRPr lang="fr-BE" dirty="0"/>
+          </a:p>
+        </p:txBody>
+      </p:sp>
+      <p:sp>
+        <p:nvSpPr>
+          <p:cNvPr id="3" name="Espace réservé du contenu 2">
+            <a:extLst>
+              <a:ext uri="{FF2B5EF4-FFF2-40B4-BE49-F238E27FC236}">
+                <a16:creationId xmlns:a16="http://schemas.microsoft.com/office/drawing/2014/main" id="{D2672DCF-DAB9-6CCC-5153-ABA5B1FF1E79}"/>
+              </a:ext>
+            </a:extLst>
+          </p:cNvPr>
+          <p:cNvSpPr>
+            <a:spLocks noGrp="1"/>
+          </p:cNvSpPr>
+          <p:nvPr>
+            <p:ph idx="1"/>
+          </p:nvPr>
+        </p:nvSpPr>
+        <p:spPr/>
+        <p:txBody>
+          <a:bodyPr/>
+          <a:lstStyle/>
+          <a:p>
+            <a:r>
+              <a:rPr lang="fr-FR" dirty="0"/>
+              <a:t>Les fichiers python sont créés dans le répertoire « src »</a:t>
+            </a:r>
+          </a:p>
+          <a:p>
+            <a:r>
+              <a:rPr lang="fr-FR" dirty="0"/>
+              <a:t>Ils commencent par un verbe (</a:t>
+            </a:r>
+            <a:r>
+              <a:rPr lang="fr-FR" dirty="0" err="1"/>
+              <a:t>create</a:t>
+            </a:r>
+            <a:r>
+              <a:rPr lang="fr-FR" dirty="0"/>
+              <a:t>, </a:t>
+            </a:r>
+            <a:r>
+              <a:rPr lang="fr-FR" dirty="0" err="1"/>
+              <a:t>read</a:t>
+            </a:r>
+            <a:r>
+              <a:rPr lang="fr-FR" dirty="0"/>
+              <a:t>, update, </a:t>
+            </a:r>
+            <a:r>
+              <a:rPr lang="fr-FR" dirty="0" err="1"/>
+              <a:t>delete</a:t>
+            </a:r>
+            <a:r>
+              <a:rPr lang="fr-FR" dirty="0"/>
+              <a:t>,…), suivi d’un tiret, suivi du nom de l’entité au singulier si l’action ne concerne qu’un seul enregistrement et au pluriel si l’action en concerne plusieurs.</a:t>
+            </a:r>
+          </a:p>
+          <a:p>
+            <a:endParaRPr lang="fr-BE" dirty="0"/>
+          </a:p>
+        </p:txBody>
+      </p:sp>
+      <p:pic>
+        <p:nvPicPr>
+          <p:cNvPr id="5" name="Image 4">
+            <a:extLst>
+              <a:ext uri="{FF2B5EF4-FFF2-40B4-BE49-F238E27FC236}">
+                <a16:creationId xmlns:a16="http://schemas.microsoft.com/office/drawing/2014/main" id="{4BF205C7-96EF-8DB0-B88F-864A824EF71B}"/>
+              </a:ext>
+            </a:extLst>
+          </p:cNvPr>
+          <p:cNvPicPr>
+            <a:picLocks noChangeAspect="1"/>
+          </p:cNvPicPr>
+          <p:nvPr/>
+        </p:nvPicPr>
+        <p:blipFill>
+          <a:blip r:embed="rId2"/>
+          <a:stretch>
+            <a:fillRect/>
+          </a:stretch>
+        </p:blipFill>
+        <p:spPr>
+          <a:xfrm>
+            <a:off x="4060658" y="3962832"/>
+            <a:ext cx="4070684" cy="2530043"/>
+          </a:xfrm>
+          <a:prstGeom prst="rect">
+            <a:avLst/>
+          </a:prstGeom>
+        </p:spPr>
+      </p:pic>
+    </p:spTree>
+    <p:extLst>
+      <p:ext uri="{BB962C8B-B14F-4D97-AF65-F5344CB8AC3E}">
+        <p14:creationId xmlns:p14="http://schemas.microsoft.com/office/powerpoint/2010/main" val="3858042417"/>
+      </p:ext>
+    </p:extLst>
+  </p:cSld>
+  <p:clrMapOvr>
+    <a:masterClrMapping/>
+  </p:clrMapOvr>
+</p:sld>
+</file>
+
+<file path=ppt/slides/slide12.xml><?xml version="1.0" encoding="utf-8"?>
+<p:sld xmlns:a="http://schemas.openxmlformats.org/drawingml/2006/main" xmlns:r="http://schemas.openxmlformats.org/officeDocument/2006/relationships" xmlns:p="http://schemas.openxmlformats.org/presentationml/2006/main">
+  <p:cSld>
+    <p:spTree>
+      <p:nvGrpSpPr>
+        <p:cNvPr id="1" name=""/>
+        <p:cNvGrpSpPr/>
+        <p:nvPr/>
+      </p:nvGrpSpPr>
+      <p:grpSpPr>
+        <a:xfrm>
+          <a:off x="0" y="0"/>
+          <a:ext cx="0" cy="0"/>
+          <a:chOff x="0" y="0"/>
+          <a:chExt cx="0" cy="0"/>
+        </a:xfrm>
+      </p:grpSpPr>
+      <p:sp>
+        <p:nvSpPr>
+          <p:cNvPr id="2" name="Titre 1">
+            <a:extLst>
+              <a:ext uri="{FF2B5EF4-FFF2-40B4-BE49-F238E27FC236}">
+                <a16:creationId xmlns:a16="http://schemas.microsoft.com/office/drawing/2014/main" id="{3F4C8D05-CAFD-901B-2D47-0B78740796DB}"/>
+              </a:ext>
+            </a:extLst>
+          </p:cNvPr>
+          <p:cNvSpPr>
+            <a:spLocks noGrp="1"/>
+          </p:cNvSpPr>
+          <p:nvPr>
+            <p:ph type="title"/>
+          </p:nvPr>
+        </p:nvSpPr>
+        <p:spPr/>
+        <p:txBody>
+          <a:bodyPr/>
+          <a:lstStyle/>
+          <a:p>
+            <a:r>
+              <a:rPr lang="fr-FR" dirty="0"/>
+              <a:t>Fonctionnement de l’application</a:t>
+            </a:r>
+            <a:endParaRPr lang="fr-BE" dirty="0"/>
+          </a:p>
+        </p:txBody>
+      </p:sp>
+      <p:sp>
+        <p:nvSpPr>
+          <p:cNvPr id="3" name="Espace réservé du contenu 2">
+            <a:extLst>
+              <a:ext uri="{FF2B5EF4-FFF2-40B4-BE49-F238E27FC236}">
+                <a16:creationId xmlns:a16="http://schemas.microsoft.com/office/drawing/2014/main" id="{9B293573-B09A-268F-3323-4B231892D698}"/>
+              </a:ext>
+            </a:extLst>
+          </p:cNvPr>
+          <p:cNvSpPr>
+            <a:spLocks noGrp="1"/>
+          </p:cNvSpPr>
+          <p:nvPr>
+            <p:ph idx="1"/>
+          </p:nvPr>
+        </p:nvSpPr>
+        <p:spPr/>
+        <p:txBody>
+          <a:bodyPr/>
+          <a:lstStyle/>
+          <a:p>
+            <a:r>
+              <a:rPr lang="fr-FR" dirty="0"/>
+              <a:t>En ligne de commande depuis le dossier « ecoleit-1sql »</a:t>
+            </a:r>
+          </a:p>
+          <a:p>
+            <a:pPr marL="0" indent="0">
+              <a:buNone/>
+            </a:pPr>
+            <a:r>
+              <a:rPr lang="fr-FR" dirty="0">
+                <a:latin typeface="Consolas" panose="020B0609020204030204" pitchFamily="49" charset="0"/>
+              </a:rPr>
+              <a:t>cd src</a:t>
+            </a:r>
+          </a:p>
+          <a:p>
+            <a:pPr marL="0" indent="0">
+              <a:buNone/>
+            </a:pPr>
+            <a:r>
+              <a:rPr lang="fr-BE" dirty="0">
+                <a:latin typeface="Consolas" panose="020B0609020204030204" pitchFamily="49" charset="0"/>
+              </a:rPr>
+              <a:t>python nom-du-script.py</a:t>
+            </a:r>
+          </a:p>
+        </p:txBody>
+      </p:sp>
+    </p:spTree>
+    <p:extLst>
+      <p:ext uri="{BB962C8B-B14F-4D97-AF65-F5344CB8AC3E}">
+        <p14:creationId xmlns:p14="http://schemas.microsoft.com/office/powerpoint/2010/main" val="217190643"/>
+      </p:ext>
+    </p:extLst>
+  </p:cSld>
+  <p:clrMapOvr>
+    <a:masterClrMapping/>
+  </p:clrMapOvr>
+</p:sld>
+</file>
+
 <file path=ppt/slides/slide2.xml><?xml version="1.0" encoding="utf-8"?>
 <p:sld xmlns:a="http://schemas.openxmlformats.org/drawingml/2006/main" xmlns:r="http://schemas.openxmlformats.org/officeDocument/2006/relationships" xmlns:p="http://schemas.openxmlformats.org/presentationml/2006/main">
   <p:cSld>
@@ -3519,23 +4231,27 @@
               <a:rPr lang="fr-BE" dirty="0"/>
               <a:t>L’applications doit permettre de:</a:t>
             </a:r>
+            <a:endParaRPr lang="fr-FR" dirty="0"/>
           </a:p>
           <a:p>
             <a:pPr lvl="1"/>
             <a:r>
-              <a:rPr lang="fr-BE" dirty="0"/>
-              <a:t>Afficher un calendrier de matches pour chaque équipe</a:t>
-            </a:r>
+              <a:rPr lang="fr-FR" dirty="0"/>
+              <a:t>Gérer les différentes entités avec des </a:t>
+            </a:r>
+            <a:r>
+              <a:rPr lang="fr-FR" dirty="0" err="1"/>
+              <a:t>CRUDs</a:t>
+            </a:r>
+            <a:endParaRPr lang="fr-FR" dirty="0"/>
           </a:p>
           <a:p>
             <a:pPr lvl="1"/>
             <a:r>
-              <a:rPr lang="fr-BE" dirty="0"/>
-              <a:t>Remplir les informations des matches au fur et à mesure.</a:t>
-            </a:r>
-          </a:p>
-          <a:p>
-            <a:endParaRPr lang="fr-FR" dirty="0"/>
+              <a:rPr lang="fr-FR" dirty="0"/>
+              <a:t>Afficher le calendrier des matchs par équipe.</a:t>
+            </a:r>
+            <a:endParaRPr lang="fr-BE" dirty="0"/>
           </a:p>
         </p:txBody>
       </p:sp>
@@ -4411,7 +5127,7 @@
           <p:cNvPr id="2" name="Titre 1">
             <a:extLst>
               <a:ext uri="{FF2B5EF4-FFF2-40B4-BE49-F238E27FC236}">
-                <a16:creationId xmlns:a16="http://schemas.microsoft.com/office/drawing/2014/main" id="{1A1863B0-1C29-5B27-50B6-664B87F82EF5}"/>
+                <a16:creationId xmlns:a16="http://schemas.microsoft.com/office/drawing/2014/main" id="{F0BFB64A-6966-FB16-3C3C-C00A36877D30}"/>
               </a:ext>
             </a:extLst>
           </p:cNvPr>
@@ -4428,408 +5144,113 @@
           <a:lstStyle/>
           <a:p>
             <a:r>
+              <a:rPr lang="fr-FR" dirty="0"/>
+              <a:t>Instructions supplémentaires</a:t>
+            </a:r>
+            <a:endParaRPr lang="fr-BE" dirty="0"/>
+          </a:p>
+        </p:txBody>
+      </p:sp>
+      <p:sp>
+        <p:nvSpPr>
+          <p:cNvPr id="3" name="Espace réservé du contenu 2">
+            <a:extLst>
+              <a:ext uri="{FF2B5EF4-FFF2-40B4-BE49-F238E27FC236}">
+                <a16:creationId xmlns:a16="http://schemas.microsoft.com/office/drawing/2014/main" id="{F42DC75E-B136-2946-5CE3-1331CB8FB25D}"/>
+              </a:ext>
+            </a:extLst>
+          </p:cNvPr>
+          <p:cNvSpPr>
+            <a:spLocks noGrp="1"/>
+          </p:cNvSpPr>
+          <p:nvPr>
+            <p:ph idx="1"/>
+          </p:nvPr>
+        </p:nvSpPr>
+        <p:spPr/>
+        <p:txBody>
+          <a:bodyPr/>
+          <a:lstStyle/>
+          <a:p>
+            <a:r>
+              <a:rPr lang="fr-FR" dirty="0"/>
+              <a:t>Pour créer un joueur</a:t>
+            </a:r>
+          </a:p>
+          <a:p>
+            <a:pPr lvl="1"/>
+            <a:r>
+              <a:rPr lang="fr-FR" dirty="0"/>
+              <a:t>Un joueur doit faire partie d’une équipe. La clé étrangère « </a:t>
+            </a:r>
+            <a:r>
               <a:rPr lang="fr-FR" dirty="0" err="1"/>
-              <a:t>AppSec</a:t>
+              <a:t>team_id</a:t>
             </a:r>
             <a:r>
               <a:rPr lang="fr-FR" dirty="0"/>
-              <a:t> – Injection SQL</a:t>
+              <a:t> » doit être renseignée. Il faut d’abord sélectionner une équipe avant de pouvoir créer le joueur.</a:t>
+            </a:r>
+          </a:p>
+          <a:p>
+            <a:r>
+              <a:rPr lang="fr-FR" dirty="0"/>
+              <a:t>Pour créer un match</a:t>
+            </a:r>
+          </a:p>
+          <a:p>
+            <a:pPr lvl="1"/>
+            <a:r>
+              <a:rPr lang="fr-FR" dirty="0"/>
+              <a:t>Même principe que pour le joueur, mais avec « </a:t>
+            </a:r>
+            <a:r>
+              <a:rPr lang="fr-FR" dirty="0" err="1"/>
+              <a:t>referee_id</a:t>
+            </a:r>
+            <a:r>
+              <a:rPr lang="fr-FR" dirty="0"/>
+              <a:t> », « </a:t>
+            </a:r>
+            <a:r>
+              <a:rPr lang="fr-FR" dirty="0" err="1"/>
+              <a:t>room_id</a:t>
+            </a:r>
+            <a:r>
+              <a:rPr lang="fr-FR" dirty="0"/>
+              <a:t> » et « </a:t>
+            </a:r>
+            <a:r>
+              <a:rPr lang="fr-FR" dirty="0" err="1"/>
+              <a:t>game_id</a:t>
+            </a:r>
+            <a:r>
+              <a:rPr lang="fr-FR" dirty="0"/>
+              <a:t> »</a:t>
+            </a:r>
+          </a:p>
+          <a:p>
+            <a:pPr lvl="1"/>
+            <a:r>
+              <a:rPr lang="fr-FR" dirty="0"/>
+              <a:t>« </a:t>
+            </a:r>
+            <a:r>
+              <a:rPr lang="fr-FR" dirty="0" err="1"/>
+              <a:t>winner_team_id</a:t>
+            </a:r>
+            <a:r>
+              <a:rPr lang="fr-FR" dirty="0"/>
+              <a:t> » n’est pas obligatoire. Il sera renseigné avec une requête « UPDATE »</a:t>
             </a:r>
             <a:endParaRPr lang="fr-BE" dirty="0"/>
-          </a:p>
-        </p:txBody>
-      </p:sp>
-      <p:sp>
-        <p:nvSpPr>
-          <p:cNvPr id="3" name="Espace réservé du contenu 2">
-            <a:extLst>
-              <a:ext uri="{FF2B5EF4-FFF2-40B4-BE49-F238E27FC236}">
-                <a16:creationId xmlns:a16="http://schemas.microsoft.com/office/drawing/2014/main" id="{4B5DAC70-8C17-C178-9F6C-0C753B4B27CD}"/>
-              </a:ext>
-            </a:extLst>
-          </p:cNvPr>
-          <p:cNvSpPr>
-            <a:spLocks noGrp="1"/>
-          </p:cNvSpPr>
-          <p:nvPr>
-            <p:ph idx="1"/>
-          </p:nvPr>
-        </p:nvSpPr>
-        <p:spPr/>
-        <p:txBody>
-          <a:bodyPr/>
-          <a:lstStyle/>
-          <a:p>
-            <a:r>
-              <a:rPr lang="fr-FR" dirty="0"/>
-              <a:t>Toujours utiliser les </a:t>
-            </a:r>
-            <a:r>
-              <a:rPr lang="fr-FR" b="1" u="sng" dirty="0"/>
-              <a:t>requêtes préparées </a:t>
-            </a:r>
-            <a:r>
-              <a:rPr lang="fr-FR" dirty="0"/>
-              <a:t>(il y en a pour tous les langages)</a:t>
-            </a:r>
-          </a:p>
-          <a:p>
-            <a:r>
-              <a:rPr lang="fr-FR" dirty="0">
-                <a:hlinkClick r:id="rId2"/>
-              </a:rPr>
-              <a:t>https://fr.wikipedia.org/wiki/Injection_SQL</a:t>
-            </a:r>
-            <a:r>
-              <a:rPr lang="fr-FR" dirty="0"/>
-              <a:t> </a:t>
-            </a:r>
-          </a:p>
-          <a:p>
-            <a:r>
-              <a:rPr lang="fr-FR" dirty="0"/>
-              <a:t>OWASP Top </a:t>
-            </a:r>
-            <a:r>
-              <a:rPr lang="fr-FR" dirty="0" err="1"/>
-              <a:t>ten</a:t>
-            </a:r>
-            <a:r>
-              <a:rPr lang="fr-FR" dirty="0"/>
-              <a:t>: </a:t>
-            </a:r>
-            <a:r>
-              <a:rPr lang="fr-FR" dirty="0">
-                <a:hlinkClick r:id="rId3"/>
-              </a:rPr>
-              <a:t>https://owasp.org/www-project-top-ten/</a:t>
-            </a:r>
-            <a:endParaRPr lang="fr-FR" dirty="0"/>
-          </a:p>
-          <a:p>
-            <a:r>
-              <a:rPr lang="fr-FR" dirty="0" err="1"/>
-              <a:t>Aituglo</a:t>
-            </a:r>
-            <a:r>
-              <a:rPr lang="fr-FR" dirty="0"/>
-              <a:t> Comment récupérer une base de donnée d'un site ?! - SQL injection </a:t>
-            </a:r>
-            <a:r>
-              <a:rPr lang="fr-FR" dirty="0">
-                <a:hlinkClick r:id="rId4"/>
-              </a:rPr>
-              <a:t>https://youtu.be/YhbggVKuxo4</a:t>
-            </a:r>
-            <a:r>
-              <a:rPr lang="fr-FR" dirty="0"/>
-              <a:t> </a:t>
-            </a:r>
-          </a:p>
-          <a:p>
-            <a:r>
-              <a:rPr lang="fr-FR" dirty="0"/>
-              <a:t>Pour ceux que la sécurité intéresse: </a:t>
-            </a:r>
-            <a:r>
-              <a:rPr lang="fr-FR" dirty="0">
-                <a:hlinkClick r:id="rId5"/>
-              </a:rPr>
-              <a:t>https://github.com/digininja/DVWA</a:t>
-            </a:r>
-            <a:r>
-              <a:rPr lang="fr-FR" dirty="0"/>
-              <a:t> </a:t>
-            </a:r>
-          </a:p>
-          <a:p>
-            <a:endParaRPr lang="fr-BE" dirty="0"/>
-          </a:p>
-        </p:txBody>
-      </p:sp>
-      <p:sp>
-        <p:nvSpPr>
-          <p:cNvPr id="4" name="Rectangle 1">
-            <a:hlinkClick r:id="rId6" tooltip="Accueil YouTube"/>
-            <a:extLst>
-              <a:ext uri="{FF2B5EF4-FFF2-40B4-BE49-F238E27FC236}">
-                <a16:creationId xmlns:a16="http://schemas.microsoft.com/office/drawing/2014/main" id="{234C80F2-3AEE-F1BA-E04E-A48FFE7663FD}"/>
-              </a:ext>
-            </a:extLst>
-          </p:cNvPr>
-          <p:cNvSpPr>
-            <a:spLocks noChangeArrowheads="1"/>
-          </p:cNvSpPr>
-          <p:nvPr/>
-        </p:nvSpPr>
-        <p:spPr bwMode="auto">
-          <a:xfrm>
-            <a:off x="0" y="0"/>
-            <a:ext cx="12192000" cy="0"/>
-          </a:xfrm>
-          <a:prstGeom prst="rect">
-            <a:avLst/>
-          </a:prstGeom>
-          <a:noFill/>
-          <a:ln>
-            <a:noFill/>
-          </a:ln>
-          <a:effectLst/>
-          <a:extLst>
-            <a:ext uri="{909E8E84-426E-40DD-AFC4-6F175D3DCCD1}">
-              <a14:hiddenFill xmlns:a14="http://schemas.microsoft.com/office/drawing/2010/main">
-                <a:solidFill>
-                  <a:schemeClr val="accent1"/>
-                </a:solidFill>
-              </a14:hiddenFill>
-            </a:ext>
-            <a:ext uri="{91240B29-F687-4F45-9708-019B960494DF}">
-              <a14:hiddenLine xmlns:a14="http://schemas.microsoft.com/office/drawing/2010/main" w="9525">
-                <a:solidFill>
-                  <a:schemeClr val="tx1"/>
-                </a:solidFill>
-                <a:miter lim="800000"/>
-                <a:headEnd/>
-                <a:tailEnd/>
-              </a14:hiddenLine>
-            </a:ext>
-            <a:ext uri="{AF507438-7753-43E0-B8FC-AC1667EBCBE1}">
-              <a14:hiddenEffects xmlns:a14="http://schemas.microsoft.com/office/drawing/2010/main">
-                <a:effectLst>
-                  <a:outerShdw dist="35921" dir="2700000" algn="ctr" rotWithShape="0">
-                    <a:schemeClr val="bg2"/>
-                  </a:outerShdw>
-                </a:effectLst>
-              </a14:hiddenEffects>
-            </a:ext>
-          </a:extLst>
-        </p:spPr>
-        <p:txBody>
-          <a:bodyPr vert="horz" wrap="square" lIns="91440" tIns="45720" rIns="91440" bIns="45720" numCol="1" anchor="ctr" anchorCtr="0" compatLnSpc="1">
-            <a:prstTxWarp prst="textNoShape">
-              <a:avLst/>
-            </a:prstTxWarp>
-            <a:spAutoFit/>
-          </a:bodyPr>
-          <a:lstStyle/>
-          <a:p>
-            <a:endParaRPr lang="fr-BE"/>
-          </a:p>
-        </p:txBody>
-      </p:sp>
-      <p:sp>
-        <p:nvSpPr>
-          <p:cNvPr id="6" name="Rectangle 3">
-            <a:hlinkClick r:id="rId7"/>
-            <a:extLst>
-              <a:ext uri="{FF2B5EF4-FFF2-40B4-BE49-F238E27FC236}">
-                <a16:creationId xmlns:a16="http://schemas.microsoft.com/office/drawing/2014/main" id="{D3D3CB18-C04B-9DF7-D4F2-ECA96FCCEC7E}"/>
-              </a:ext>
-            </a:extLst>
-          </p:cNvPr>
-          <p:cNvSpPr>
-            <a:spLocks noChangeArrowheads="1"/>
-          </p:cNvSpPr>
-          <p:nvPr/>
-        </p:nvSpPr>
-        <p:spPr bwMode="auto">
-          <a:xfrm>
-            <a:off x="0" y="0"/>
-            <a:ext cx="2057400" cy="0"/>
-          </a:xfrm>
-          <a:prstGeom prst="rect">
-            <a:avLst/>
-          </a:prstGeom>
-          <a:noFill/>
-          <a:ln>
-            <a:noFill/>
-          </a:ln>
-          <a:effectLst/>
-          <a:extLst>
-            <a:ext uri="{909E8E84-426E-40DD-AFC4-6F175D3DCCD1}">
-              <a14:hiddenFill xmlns:a14="http://schemas.microsoft.com/office/drawing/2010/main">
-                <a:solidFill>
-                  <a:schemeClr val="accent1"/>
-                </a:solidFill>
-              </a14:hiddenFill>
-            </a:ext>
-            <a:ext uri="{91240B29-F687-4F45-9708-019B960494DF}">
-              <a14:hiddenLine xmlns:a14="http://schemas.microsoft.com/office/drawing/2010/main" w="9525">
-                <a:solidFill>
-                  <a:schemeClr val="tx1"/>
-                </a:solidFill>
-                <a:miter lim="800000"/>
-                <a:headEnd/>
-                <a:tailEnd/>
-              </a14:hiddenLine>
-            </a:ext>
-            <a:ext uri="{AF507438-7753-43E0-B8FC-AC1667EBCBE1}">
-              <a14:hiddenEffects xmlns:a14="http://schemas.microsoft.com/office/drawing/2010/main">
-                <a:effectLst>
-                  <a:outerShdw dist="35921" dir="2700000" algn="ctr" rotWithShape="0">
-                    <a:schemeClr val="bg2"/>
-                  </a:outerShdw>
-                </a:effectLst>
-              </a14:hiddenEffects>
-            </a:ext>
-          </a:extLst>
-        </p:spPr>
-        <p:txBody>
-          <a:bodyPr vert="horz" wrap="square" lIns="91440" tIns="45720" rIns="91440" bIns="45720" numCol="1" anchor="ctr" anchorCtr="0" compatLnSpc="1">
-            <a:prstTxWarp prst="textNoShape">
-              <a:avLst/>
-            </a:prstTxWarp>
-            <a:spAutoFit/>
-          </a:bodyPr>
-          <a:lstStyle/>
-          <a:p>
-            <a:endParaRPr lang="fr-BE"/>
-          </a:p>
-        </p:txBody>
-      </p:sp>
-      <p:sp>
-        <p:nvSpPr>
-          <p:cNvPr id="7" name="Rectangle 4">
-            <a:hlinkClick r:id="rId8"/>
-            <a:extLst>
-              <a:ext uri="{FF2B5EF4-FFF2-40B4-BE49-F238E27FC236}">
-                <a16:creationId xmlns:a16="http://schemas.microsoft.com/office/drawing/2014/main" id="{65D55827-796E-5D27-9651-0615AD163155}"/>
-              </a:ext>
-            </a:extLst>
-          </p:cNvPr>
-          <p:cNvSpPr>
-            <a:spLocks noChangeArrowheads="1"/>
-          </p:cNvSpPr>
-          <p:nvPr/>
-        </p:nvSpPr>
-        <p:spPr bwMode="auto">
-          <a:xfrm>
-            <a:off x="0" y="0"/>
-            <a:ext cx="984250" cy="0"/>
-          </a:xfrm>
-          <a:prstGeom prst="rect">
-            <a:avLst/>
-          </a:prstGeom>
-          <a:noFill/>
-          <a:ln>
-            <a:noFill/>
-          </a:ln>
-          <a:effectLst/>
-          <a:extLst>
-            <a:ext uri="{909E8E84-426E-40DD-AFC4-6F175D3DCCD1}">
-              <a14:hiddenFill xmlns:a14="http://schemas.microsoft.com/office/drawing/2010/main">
-                <a:solidFill>
-                  <a:schemeClr val="accent1"/>
-                </a:solidFill>
-              </a14:hiddenFill>
-            </a:ext>
-            <a:ext uri="{91240B29-F687-4F45-9708-019B960494DF}">
-              <a14:hiddenLine xmlns:a14="http://schemas.microsoft.com/office/drawing/2010/main" w="9525">
-                <a:solidFill>
-                  <a:schemeClr val="tx1"/>
-                </a:solidFill>
-                <a:miter lim="800000"/>
-                <a:headEnd/>
-                <a:tailEnd/>
-              </a14:hiddenLine>
-            </a:ext>
-            <a:ext uri="{AF507438-7753-43E0-B8FC-AC1667EBCBE1}">
-              <a14:hiddenEffects xmlns:a14="http://schemas.microsoft.com/office/drawing/2010/main">
-                <a:effectLst>
-                  <a:outerShdw dist="35921" dir="2700000" algn="ctr" rotWithShape="0">
-                    <a:schemeClr val="bg2"/>
-                  </a:outerShdw>
-                </a:effectLst>
-              </a14:hiddenEffects>
-            </a:ext>
-          </a:extLst>
-        </p:spPr>
-        <p:txBody>
-          <a:bodyPr vert="horz" wrap="square" lIns="91440" tIns="45720" rIns="91440" bIns="45720" numCol="1" anchor="ctr" anchorCtr="0" compatLnSpc="1">
-            <a:prstTxWarp prst="textNoShape">
-              <a:avLst/>
-            </a:prstTxWarp>
-            <a:spAutoFit/>
-          </a:bodyPr>
-          <a:lstStyle/>
-          <a:p>
-            <a:endParaRPr lang="fr-BE"/>
-          </a:p>
-        </p:txBody>
-      </p:sp>
-      <p:sp>
-        <p:nvSpPr>
-          <p:cNvPr id="8" name="Rectangle 5">
-            <a:extLst>
-              <a:ext uri="{FF2B5EF4-FFF2-40B4-BE49-F238E27FC236}">
-                <a16:creationId xmlns:a16="http://schemas.microsoft.com/office/drawing/2014/main" id="{B0E307A5-5347-FE04-541C-F27C8E036A6B}"/>
-              </a:ext>
-            </a:extLst>
-          </p:cNvPr>
-          <p:cNvSpPr>
-            <a:spLocks noChangeArrowheads="1"/>
-          </p:cNvSpPr>
-          <p:nvPr/>
-        </p:nvSpPr>
-        <p:spPr bwMode="auto">
-          <a:xfrm>
-            <a:off x="0" y="0"/>
-            <a:ext cx="12192000" cy="0"/>
-          </a:xfrm>
-          <a:prstGeom prst="rect">
-            <a:avLst/>
-          </a:prstGeom>
-          <a:noFill/>
-          <a:ln>
-            <a:noFill/>
-          </a:ln>
-          <a:effectLst/>
-          <a:extLst>
-            <a:ext uri="{909E8E84-426E-40DD-AFC4-6F175D3DCCD1}">
-              <a14:hiddenFill xmlns:a14="http://schemas.microsoft.com/office/drawing/2010/main">
-                <a:solidFill>
-                  <a:schemeClr val="accent1"/>
-                </a:solidFill>
-              </a14:hiddenFill>
-            </a:ext>
-            <a:ext uri="{91240B29-F687-4F45-9708-019B960494DF}">
-              <a14:hiddenLine xmlns:a14="http://schemas.microsoft.com/office/drawing/2010/main" w="9525">
-                <a:solidFill>
-                  <a:schemeClr val="tx1"/>
-                </a:solidFill>
-                <a:miter lim="800000"/>
-                <a:headEnd/>
-                <a:tailEnd/>
-              </a14:hiddenLine>
-            </a:ext>
-            <a:ext uri="{AF507438-7753-43E0-B8FC-AC1667EBCBE1}">
-              <a14:hiddenEffects xmlns:a14="http://schemas.microsoft.com/office/drawing/2010/main">
-                <a:effectLst>
-                  <a:outerShdw dist="35921" dir="2700000" algn="ctr" rotWithShape="0">
-                    <a:schemeClr val="bg2"/>
-                  </a:outerShdw>
-                </a:effectLst>
-              </a14:hiddenEffects>
-            </a:ext>
-          </a:extLst>
-        </p:spPr>
-        <p:txBody>
-          <a:bodyPr vert="horz" wrap="none" lIns="91440" tIns="45720" rIns="91440" bIns="45720" numCol="1" anchor="ctr" anchorCtr="0" compatLnSpc="1">
-            <a:prstTxWarp prst="textNoShape">
-              <a:avLst/>
-            </a:prstTxWarp>
-            <a:spAutoFit/>
-          </a:bodyPr>
-          <a:lstStyle/>
-          <a:p>
-            <a:endParaRPr lang="fr-BE"/>
           </a:p>
         </p:txBody>
       </p:sp>
     </p:spTree>
     <p:extLst>
       <p:ext uri="{BB962C8B-B14F-4D97-AF65-F5344CB8AC3E}">
-        <p14:creationId xmlns:p14="http://schemas.microsoft.com/office/powerpoint/2010/main" val="2480734286"/>
+        <p14:creationId xmlns:p14="http://schemas.microsoft.com/office/powerpoint/2010/main" val="2353579221"/>
       </p:ext>
     </p:extLst>
   </p:cSld>
@@ -4861,7 +5282,7 @@
           <p:cNvPr id="2" name="Titre 1">
             <a:extLst>
               <a:ext uri="{FF2B5EF4-FFF2-40B4-BE49-F238E27FC236}">
-                <a16:creationId xmlns:a16="http://schemas.microsoft.com/office/drawing/2014/main" id="{C6C832A5-9A2B-E876-1325-DD9386E5996A}"/>
+                <a16:creationId xmlns:a16="http://schemas.microsoft.com/office/drawing/2014/main" id="{E572BB53-3627-5E43-69BA-5B60B5503880}"/>
               </a:ext>
             </a:extLst>
           </p:cNvPr>
@@ -4879,7 +5300,7 @@
           <a:p>
             <a:r>
               <a:rPr lang="fr-FR" dirty="0"/>
-              <a:t>Organisation des fichiers</a:t>
+              <a:t>Validation des entrées</a:t>
             </a:r>
             <a:endParaRPr lang="fr-BE" dirty="0"/>
           </a:p>
@@ -4890,7 +5311,7 @@
           <p:cNvPr id="3" name="Espace réservé du contenu 2">
             <a:extLst>
               <a:ext uri="{FF2B5EF4-FFF2-40B4-BE49-F238E27FC236}">
-                <a16:creationId xmlns:a16="http://schemas.microsoft.com/office/drawing/2014/main" id="{D2672DCF-DAB9-6CCC-5153-ABA5B1FF1E79}"/>
+                <a16:creationId xmlns:a16="http://schemas.microsoft.com/office/drawing/2014/main" id="{DDC72F50-42F3-D928-6048-FA92C742C27F}"/>
               </a:ext>
             </a:extLst>
           </p:cNvPr>
@@ -4903,17 +5324,76 @@
         </p:nvSpPr>
         <p:spPr/>
         <p:txBody>
-          <a:bodyPr/>
-          <a:lstStyle/>
-          <a:p>
-            <a:endParaRPr lang="fr-BE"/>
+          <a:bodyPr>
+            <a:normAutofit lnSpcReduction="10000"/>
+          </a:bodyPr>
+          <a:lstStyle/>
+          <a:p>
+            <a:r>
+              <a:rPr lang="fr-FR" dirty="0"/>
+              <a:t>Conversion des entiers ( </a:t>
+            </a:r>
+            <a:r>
+              <a:rPr lang="fr-FR" dirty="0" err="1"/>
+              <a:t>int</a:t>
+            </a:r>
+            <a:r>
+              <a:rPr lang="fr-FR" dirty="0"/>
+              <a:t>() )</a:t>
+            </a:r>
+          </a:p>
+          <a:p>
+            <a:r>
+              <a:rPr lang="fr-FR" dirty="0"/>
+              <a:t>Valeurs min et max pour: les dates, les entiers,  longueurs des chaînes de caractères</a:t>
+            </a:r>
+          </a:p>
+          <a:p>
+            <a:r>
+              <a:rPr lang="fr-FR" dirty="0"/>
+              <a:t>Tableau des valeurs autorisées (white </a:t>
+            </a:r>
+            <a:r>
+              <a:rPr lang="fr-FR" dirty="0" err="1"/>
+              <a:t>list</a:t>
+            </a:r>
+            <a:r>
+              <a:rPr lang="fr-FR" dirty="0"/>
+              <a:t>) pour les petites listes de paramètres (ex: jours de la semaine)</a:t>
+            </a:r>
+          </a:p>
+          <a:p>
+            <a:r>
+              <a:rPr lang="fr-FR" dirty="0"/>
+              <a:t>Expression régulières pour certaines données structurées (IP, adresse email,…)</a:t>
+            </a:r>
+          </a:p>
+          <a:p>
+            <a:endParaRPr lang="fr-FR" dirty="0"/>
+          </a:p>
+          <a:p>
+            <a:r>
+              <a:rPr lang="fr-FR" sz="2200" dirty="0"/>
+              <a:t>Plus d’infos sur: </a:t>
+            </a:r>
+            <a:r>
+              <a:rPr lang="fr-FR" sz="2200" dirty="0">
+                <a:hlinkClick r:id="rId2"/>
+              </a:rPr>
+              <a:t>https://cheatsheetseries.owasp.org/cheatsheets/Input_Validation_Cheat_Sheet.html</a:t>
+            </a:r>
+            <a:r>
+              <a:rPr lang="fr-FR" sz="2200" dirty="0"/>
+              <a:t> </a:t>
+            </a:r>
+            <a:endParaRPr lang="fr-BE" sz="2200" dirty="0"/>
           </a:p>
         </p:txBody>
       </p:sp>
     </p:spTree>
     <p:extLst>
       <p:ext uri="{BB962C8B-B14F-4D97-AF65-F5344CB8AC3E}">
-        <p14:creationId xmlns:p14="http://schemas.microsoft.com/office/powerpoint/2010/main" val="3858042417"/>
+        <p14:creationId xmlns:p14="http://schemas.microsoft.com/office/powerpoint/2010/main" val="3893673533"/>
       </p:ext>
     </p:extLst>
   </p:cSld>

</xml_diff>